<commit_message>
Update session 15 and related documents.
</commit_message>
<xml_diff>
--- a/CPSC-24700/Presentations/session-15.pptx
+++ b/CPSC-24700/Presentations/session-15.pptx
@@ -118,6 +118,10 @@
     </p:ext>
   </p:extLst>
 </p:presentation>
+</file>
+
+<file path=ppt/revisionInfo.xml><?xml version="1.0" encoding="utf-8"?>
+<p1510:revInfo xmlns:a="http://schemas.openxmlformats.org/drawingml/2006/main" xmlns:r="http://schemas.openxmlformats.org/officeDocument/2006/relationships" xmlns:p1510="http://schemas.microsoft.com/office/powerpoint/2015/10/main"/>
 </file>
 
 <file path=ppt/notesMasters/notesMaster1.xml><?xml version="1.0" encoding="utf-8"?>
@@ -4732,15 +4736,18 @@
           <a:p>
             <a:r>
               <a:rPr lang="en-US" sz="2000" dirty="0"/>
-              <a:t>Review and Fully Understand Yahtzee Dice Roller application… convert is so that </a:t>
+              <a:t>Review and Fully Understand Yahtzee Dice Roller application… convert it so that it utilizes a external </a:t>
             </a:r>
             <a:r>
               <a:rPr lang="en-US" sz="2000"/>
-              <a:t>it utilizes </a:t>
-            </a:r>
+              <a:t>CSS file*</a:t>
+            </a:r>
+            <a:endParaRPr lang="en-US" sz="2000" dirty="0"/>
+          </a:p>
+          <a:p>
             <a:r>
               <a:rPr lang="en-US" sz="2000" dirty="0"/>
-              <a:t>a external CSS file</a:t>
+              <a:t>Week 6 Lab: JavaScript and HTML Interaction</a:t>
             </a:r>
           </a:p>
           <a:p>
@@ -4814,14 +4821,14 @@
           <a:p>
             <a:r>
               <a:rPr lang="en-US" sz="4800" dirty="0"/>
-              <a:t>Week 6 Lab:</a:t>
+              <a:t>Week 6 Lab: </a:t>
             </a:r>
             <a:br>
               <a:rPr lang="en-US" sz="4800" dirty="0"/>
             </a:br>
             <a:r>
               <a:rPr lang="en-US" sz="4800" dirty="0"/>
-              <a:t>Week 5 Lab: JavaScript Basics</a:t>
+              <a:t>JavaScript and HTML Interaction</a:t>
             </a:r>
           </a:p>
         </p:txBody>

</xml_diff>